<commit_message>
end of PPT data
</commit_message>
<xml_diff>
--- a/이미지자료.pptx
+++ b/이미지자료.pptx
@@ -6,6 +6,8 @@
   </p:sldMasterIdLst>
   <p:sldIdLst>
     <p:sldId id="256" r:id="rId2"/>
+    <p:sldId id="257" r:id="rId3"/>
+    <p:sldId id="258" r:id="rId4"/>
   </p:sldIdLst>
   <p:sldSz cx="12192000" cy="6858000"/>
   <p:notesSz cx="6858000" cy="9144000"/>
@@ -259,7 +261,7 @@
           <a:p>
             <a:fld id="{701607F4-C216-4D44-B5DA-B127B3D7767A}" type="datetimeFigureOut">
               <a:rPr lang="ko-KR" altLang="en-US" smtClean="0"/>
-              <a:t>2019-05-14</a:t>
+              <a:t>2019-05-16</a:t>
             </a:fld>
             <a:endParaRPr lang="ko-KR" altLang="en-US"/>
           </a:p>
@@ -457,7 +459,7 @@
           <a:p>
             <a:fld id="{701607F4-C216-4D44-B5DA-B127B3D7767A}" type="datetimeFigureOut">
               <a:rPr lang="ko-KR" altLang="en-US" smtClean="0"/>
-              <a:t>2019-05-14</a:t>
+              <a:t>2019-05-16</a:t>
             </a:fld>
             <a:endParaRPr lang="ko-KR" altLang="en-US"/>
           </a:p>
@@ -665,7 +667,7 @@
           <a:p>
             <a:fld id="{701607F4-C216-4D44-B5DA-B127B3D7767A}" type="datetimeFigureOut">
               <a:rPr lang="ko-KR" altLang="en-US" smtClean="0"/>
-              <a:t>2019-05-14</a:t>
+              <a:t>2019-05-16</a:t>
             </a:fld>
             <a:endParaRPr lang="ko-KR" altLang="en-US"/>
           </a:p>
@@ -863,7 +865,7 @@
           <a:p>
             <a:fld id="{701607F4-C216-4D44-B5DA-B127B3D7767A}" type="datetimeFigureOut">
               <a:rPr lang="ko-KR" altLang="en-US" smtClean="0"/>
-              <a:t>2019-05-14</a:t>
+              <a:t>2019-05-16</a:t>
             </a:fld>
             <a:endParaRPr lang="ko-KR" altLang="en-US"/>
           </a:p>
@@ -1138,7 +1140,7 @@
           <a:p>
             <a:fld id="{701607F4-C216-4D44-B5DA-B127B3D7767A}" type="datetimeFigureOut">
               <a:rPr lang="ko-KR" altLang="en-US" smtClean="0"/>
-              <a:t>2019-05-14</a:t>
+              <a:t>2019-05-16</a:t>
             </a:fld>
             <a:endParaRPr lang="ko-KR" altLang="en-US"/>
           </a:p>
@@ -1403,7 +1405,7 @@
           <a:p>
             <a:fld id="{701607F4-C216-4D44-B5DA-B127B3D7767A}" type="datetimeFigureOut">
               <a:rPr lang="ko-KR" altLang="en-US" smtClean="0"/>
-              <a:t>2019-05-14</a:t>
+              <a:t>2019-05-16</a:t>
             </a:fld>
             <a:endParaRPr lang="ko-KR" altLang="en-US"/>
           </a:p>
@@ -1815,7 +1817,7 @@
           <a:p>
             <a:fld id="{701607F4-C216-4D44-B5DA-B127B3D7767A}" type="datetimeFigureOut">
               <a:rPr lang="ko-KR" altLang="en-US" smtClean="0"/>
-              <a:t>2019-05-14</a:t>
+              <a:t>2019-05-16</a:t>
             </a:fld>
             <a:endParaRPr lang="ko-KR" altLang="en-US"/>
           </a:p>
@@ -1956,7 +1958,7 @@
           <a:p>
             <a:fld id="{701607F4-C216-4D44-B5DA-B127B3D7767A}" type="datetimeFigureOut">
               <a:rPr lang="ko-KR" altLang="en-US" smtClean="0"/>
-              <a:t>2019-05-14</a:t>
+              <a:t>2019-05-16</a:t>
             </a:fld>
             <a:endParaRPr lang="ko-KR" altLang="en-US"/>
           </a:p>
@@ -2069,7 +2071,7 @@
           <a:p>
             <a:fld id="{701607F4-C216-4D44-B5DA-B127B3D7767A}" type="datetimeFigureOut">
               <a:rPr lang="ko-KR" altLang="en-US" smtClean="0"/>
-              <a:t>2019-05-14</a:t>
+              <a:t>2019-05-16</a:t>
             </a:fld>
             <a:endParaRPr lang="ko-KR" altLang="en-US"/>
           </a:p>
@@ -2380,7 +2382,7 @@
           <a:p>
             <a:fld id="{701607F4-C216-4D44-B5DA-B127B3D7767A}" type="datetimeFigureOut">
               <a:rPr lang="ko-KR" altLang="en-US" smtClean="0"/>
-              <a:t>2019-05-14</a:t>
+              <a:t>2019-05-16</a:t>
             </a:fld>
             <a:endParaRPr lang="ko-KR" altLang="en-US"/>
           </a:p>
@@ -2668,7 +2670,7 @@
           <a:p>
             <a:fld id="{701607F4-C216-4D44-B5DA-B127B3D7767A}" type="datetimeFigureOut">
               <a:rPr lang="ko-KR" altLang="en-US" smtClean="0"/>
-              <a:t>2019-05-14</a:t>
+              <a:t>2019-05-16</a:t>
             </a:fld>
             <a:endParaRPr lang="ko-KR" altLang="en-US"/>
           </a:p>
@@ -2909,7 +2911,7 @@
           <a:p>
             <a:fld id="{701607F4-C216-4D44-B5DA-B127B3D7767A}" type="datetimeFigureOut">
               <a:rPr lang="ko-KR" altLang="en-US" smtClean="0"/>
-              <a:t>2019-05-14</a:t>
+              <a:t>2019-05-16</a:t>
             </a:fld>
             <a:endParaRPr lang="ko-KR" altLang="en-US"/>
           </a:p>
@@ -3398,7 +3400,7 @@
         </p:nvSpPr>
         <p:spPr>
           <a:xfrm>
-            <a:off x="2355864" y="2757964"/>
+            <a:off x="2355864" y="3277918"/>
             <a:ext cx="1619672" cy="744070"/>
           </a:xfrm>
           <a:prstGeom prst="roundRect">
@@ -3514,7 +3516,7 @@
         </p:nvSpPr>
         <p:spPr>
           <a:xfrm>
-            <a:off x="382550" y="2778633"/>
+            <a:off x="382550" y="3271694"/>
             <a:ext cx="1619672" cy="744070"/>
           </a:xfrm>
           <a:prstGeom prst="roundRect">
@@ -3630,7 +3632,7 @@
         </p:nvSpPr>
         <p:spPr>
           <a:xfrm>
-            <a:off x="4427632" y="2760704"/>
+            <a:off x="4427632" y="3280658"/>
             <a:ext cx="1619672" cy="744070"/>
           </a:xfrm>
           <a:prstGeom prst="roundRect">
@@ -3688,7 +3690,7 @@
         </p:nvSpPr>
         <p:spPr>
           <a:xfrm>
-            <a:off x="382550" y="4049888"/>
+            <a:off x="382550" y="4309866"/>
             <a:ext cx="1619672" cy="744070"/>
           </a:xfrm>
           <a:prstGeom prst="roundRect">
@@ -3746,7 +3748,7 @@
         </p:nvSpPr>
         <p:spPr>
           <a:xfrm>
-            <a:off x="2355864" y="4067814"/>
+            <a:off x="2355864" y="4300897"/>
             <a:ext cx="1619672" cy="744070"/>
           </a:xfrm>
           <a:prstGeom prst="roundRect">
@@ -3783,12 +3785,8 @@
           <a:p>
             <a:pPr algn="ctr"/>
             <a:r>
-              <a:rPr lang="en-US" altLang="ko-KR" b="1" dirty="0" err="1"/>
-              <a:t>Packdage</a:t>
-            </a:r>
-            <a:r>
               <a:rPr lang="en-US" altLang="ko-KR" b="1" dirty="0"/>
-              <a:t> Diagram</a:t>
+              <a:t>Package Diagram</a:t>
             </a:r>
             <a:endParaRPr lang="ko-KR" altLang="en-US" b="1" dirty="0"/>
           </a:p>
@@ -3808,7 +3806,7 @@
         </p:nvSpPr>
         <p:spPr>
           <a:xfrm>
-            <a:off x="4430403" y="4058852"/>
+            <a:off x="4430403" y="4300899"/>
             <a:ext cx="1619672" cy="744070"/>
           </a:xfrm>
           <a:prstGeom prst="roundRect">
@@ -3924,7 +3922,7 @@
         </p:nvSpPr>
         <p:spPr>
           <a:xfrm>
-            <a:off x="9655594" y="2667850"/>
+            <a:off x="9494235" y="2802325"/>
             <a:ext cx="1619672" cy="744070"/>
           </a:xfrm>
           <a:prstGeom prst="roundRect">
@@ -3982,7 +3980,7 @@
         </p:nvSpPr>
         <p:spPr>
           <a:xfrm>
-            <a:off x="6954532" y="2671057"/>
+            <a:off x="6829024" y="2796567"/>
             <a:ext cx="1619672" cy="744070"/>
           </a:xfrm>
           <a:prstGeom prst="roundRect">
@@ -4040,7 +4038,7 @@
         </p:nvSpPr>
         <p:spPr>
           <a:xfrm>
-            <a:off x="9382713" y="3665724"/>
+            <a:off x="9490293" y="3701584"/>
             <a:ext cx="1619672" cy="744070"/>
           </a:xfrm>
           <a:prstGeom prst="roundRect">
@@ -4098,7 +4096,7 @@
         </p:nvSpPr>
         <p:spPr>
           <a:xfrm>
-            <a:off x="6954532" y="3671939"/>
+            <a:off x="6846952" y="3698834"/>
             <a:ext cx="1619672" cy="744070"/>
           </a:xfrm>
           <a:prstGeom prst="roundRect">
@@ -4156,8 +4154,8 @@
         </p:nvSpPr>
         <p:spPr>
           <a:xfrm>
-            <a:off x="10465430" y="4945772"/>
-            <a:ext cx="1619672" cy="744070"/>
+            <a:off x="10560730" y="5921216"/>
+            <a:ext cx="1412045" cy="611770"/>
           </a:xfrm>
           <a:prstGeom prst="roundRect">
             <a:avLst/>
@@ -4193,10 +4191,10 @@
           <a:p>
             <a:pPr algn="ctr"/>
             <a:r>
-              <a:rPr lang="en-US" altLang="ko-KR" sz="1400" b="1" dirty="0"/>
+              <a:rPr lang="en-US" altLang="ko-KR" sz="1200" b="1" dirty="0"/>
               <a:t>Communication Diagram</a:t>
             </a:r>
-            <a:endParaRPr lang="ko-KR" altLang="en-US" sz="1400" b="1" dirty="0"/>
+            <a:endParaRPr lang="ko-KR" altLang="en-US" sz="1200" b="1" dirty="0"/>
           </a:p>
         </p:txBody>
       </p:sp>
@@ -4214,8 +4212,8 @@
         </p:nvSpPr>
         <p:spPr>
           <a:xfrm>
-            <a:off x="8424091" y="4945772"/>
-            <a:ext cx="1619672" cy="744070"/>
+            <a:off x="8495811" y="5180516"/>
+            <a:ext cx="1412045" cy="509325"/>
           </a:xfrm>
           <a:prstGeom prst="roundRect">
             <a:avLst/>
@@ -4251,10 +4249,10 @@
           <a:p>
             <a:pPr algn="ctr"/>
             <a:r>
-              <a:rPr lang="en-US" altLang="ko-KR" b="1" dirty="0"/>
+              <a:rPr lang="en-US" altLang="ko-KR" sz="1500" b="1" dirty="0"/>
               <a:t>Sequence Diagram</a:t>
             </a:r>
-            <a:endParaRPr lang="ko-KR" altLang="en-US" b="1" dirty="0"/>
+            <a:endParaRPr lang="ko-KR" altLang="en-US" sz="1500" b="1" dirty="0"/>
           </a:p>
         </p:txBody>
       </p:sp>
@@ -4272,8 +4270,8 @@
         </p:nvSpPr>
         <p:spPr>
           <a:xfrm>
-            <a:off x="10465430" y="5921215"/>
-            <a:ext cx="1619672" cy="744070"/>
+            <a:off x="10535719" y="5180515"/>
+            <a:ext cx="1412045" cy="509326"/>
           </a:xfrm>
           <a:prstGeom prst="roundRect">
             <a:avLst/>
@@ -4309,10 +4307,10 @@
           <a:p>
             <a:pPr algn="ctr"/>
             <a:r>
-              <a:rPr lang="en-US" altLang="ko-KR" b="1" dirty="0"/>
+              <a:rPr lang="en-US" altLang="ko-KR" sz="1500" b="1" dirty="0"/>
               <a:t>Timing Diagram</a:t>
             </a:r>
-            <a:endParaRPr lang="ko-KR" altLang="en-US" b="1" dirty="0"/>
+            <a:endParaRPr lang="ko-KR" altLang="en-US" sz="1500" b="1" dirty="0"/>
           </a:p>
         </p:txBody>
       </p:sp>
@@ -4330,8 +4328,8 @@
         </p:nvSpPr>
         <p:spPr>
           <a:xfrm>
-            <a:off x="8375614" y="5921215"/>
-            <a:ext cx="1619672" cy="744070"/>
+            <a:off x="8511449" y="5921215"/>
+            <a:ext cx="1404292" cy="610513"/>
           </a:xfrm>
           <a:prstGeom prst="roundRect">
             <a:avLst/>
@@ -4367,10 +4365,10 @@
           <a:p>
             <a:pPr algn="ctr"/>
             <a:r>
-              <a:rPr lang="en-US" altLang="ko-KR" sz="1500" b="1" dirty="0"/>
+              <a:rPr lang="en-US" altLang="ko-KR" sz="1200" b="1" dirty="0"/>
               <a:t>Interaction Overview Diagram</a:t>
             </a:r>
-            <a:endParaRPr lang="ko-KR" altLang="en-US" sz="1500" b="1" dirty="0"/>
+            <a:endParaRPr lang="ko-KR" altLang="en-US" sz="1200" b="1" dirty="0"/>
           </a:p>
         </p:txBody>
       </p:sp>
@@ -4657,14 +4655,6 @@
           <a:lstStyle/>
           <a:p>
             <a:pPr algn="ctr"/>
-            <a:r>
-              <a:rPr lang="en-US" altLang="ko-KR" b="1" dirty="0">
-                <a:solidFill>
-                  <a:srgbClr val="FF0000"/>
-                </a:solidFill>
-              </a:rPr>
-              <a:t>Package 1</a:t>
-            </a:r>
             <a:endParaRPr lang="ko-KR" altLang="en-US" b="1" dirty="0">
               <a:solidFill>
                 <a:srgbClr val="FF0000"/>
@@ -4687,7 +4677,7 @@
         </p:nvSpPr>
         <p:spPr>
           <a:xfrm>
-            <a:off x="10348987" y="2154469"/>
+            <a:off x="6755445" y="2176523"/>
             <a:ext cx="1061963" cy="357948"/>
           </a:xfrm>
           <a:prstGeom prst="rect">
@@ -4725,14 +4715,6 @@
           <a:lstStyle/>
           <a:p>
             <a:pPr algn="ctr"/>
-            <a:r>
-              <a:rPr lang="en-US" altLang="ko-KR" sz="1400" b="1" dirty="0">
-                <a:solidFill>
-                  <a:srgbClr val="FF0000"/>
-                </a:solidFill>
-              </a:rPr>
-              <a:t>Package 2</a:t>
-            </a:r>
             <a:endParaRPr lang="ko-KR" altLang="en-US" sz="1400" b="1" dirty="0">
               <a:solidFill>
                 <a:srgbClr val="FF0000"/>
@@ -4755,8 +4737,8 @@
         </p:nvSpPr>
         <p:spPr>
           <a:xfrm>
-            <a:off x="7293993" y="4900974"/>
-            <a:ext cx="1061963" cy="357948"/>
+            <a:off x="8362007" y="4623550"/>
+            <a:ext cx="952323" cy="262096"/>
           </a:xfrm>
           <a:prstGeom prst="rect">
             <a:avLst/>
@@ -4793,15 +4775,95 @@
           <a:lstStyle/>
           <a:p>
             <a:pPr algn="ctr"/>
-            <a:r>
-              <a:rPr lang="en-US" altLang="ko-KR" sz="1400" b="1" dirty="0">
+            <a:endParaRPr lang="ko-KR" altLang="en-US" sz="1400" b="1" dirty="0">
+              <a:solidFill>
+                <a:srgbClr val="FF0000"/>
+              </a:solidFill>
+            </a:endParaRPr>
+          </a:p>
+        </p:txBody>
+      </p:sp>
+      <p:sp>
+        <p:nvSpPr>
+          <p:cNvPr id="2" name="직사각형 1">
+            <a:extLst>
+              <a:ext uri="{FF2B5EF4-FFF2-40B4-BE49-F238E27FC236}">
+                <a16:creationId xmlns:a16="http://schemas.microsoft.com/office/drawing/2014/main" id="{79D84F99-0ECD-453D-A75B-E1A4B6282669}"/>
+              </a:ext>
+            </a:extLst>
+          </p:cNvPr>
+          <p:cNvSpPr/>
+          <p:nvPr/>
+        </p:nvSpPr>
+        <p:spPr>
+          <a:xfrm>
+            <a:off x="2513170" y="2675635"/>
+            <a:ext cx="1297150" cy="369332"/>
+          </a:xfrm>
+          <a:prstGeom prst="rect">
+            <a:avLst/>
+          </a:prstGeom>
+        </p:spPr>
+        <p:txBody>
+          <a:bodyPr wrap="none">
+            <a:spAutoFit/>
+          </a:bodyPr>
+          <a:lstStyle/>
+          <a:p>
+            <a:pPr algn="ctr"/>
+            <a:r>
+              <a:rPr lang="en-US" altLang="ko-KR" b="1" dirty="0">
+                <a:solidFill>
+                  <a:srgbClr val="FF0000"/>
+                </a:solidFill>
+              </a:rPr>
+              <a:t>Package 1</a:t>
+            </a:r>
+            <a:endParaRPr lang="ko-KR" altLang="en-US" b="1" dirty="0">
+              <a:solidFill>
+                <a:srgbClr val="FF0000"/>
+              </a:solidFill>
+            </a:endParaRPr>
+          </a:p>
+        </p:txBody>
+      </p:sp>
+      <p:sp>
+        <p:nvSpPr>
+          <p:cNvPr id="3" name="직사각형 2">
+            <a:extLst>
+              <a:ext uri="{FF2B5EF4-FFF2-40B4-BE49-F238E27FC236}">
+                <a16:creationId xmlns:a16="http://schemas.microsoft.com/office/drawing/2014/main" id="{A800EE67-A9B1-4173-9281-7FCE13B6C9AC}"/>
+              </a:ext>
+            </a:extLst>
+          </p:cNvPr>
+          <p:cNvSpPr/>
+          <p:nvPr/>
+        </p:nvSpPr>
+        <p:spPr>
+          <a:xfrm>
+            <a:off x="8310572" y="2524688"/>
+            <a:ext cx="1297150" cy="369332"/>
+          </a:xfrm>
+          <a:prstGeom prst="rect">
+            <a:avLst/>
+          </a:prstGeom>
+        </p:spPr>
+        <p:txBody>
+          <a:bodyPr wrap="none">
+            <a:spAutoFit/>
+          </a:bodyPr>
+          <a:lstStyle/>
+          <a:p>
+            <a:pPr algn="ctr"/>
+            <a:r>
+              <a:rPr lang="en-US" altLang="ko-KR" b="1" dirty="0">
                 <a:solidFill>
                   <a:srgbClr val="FF0000"/>
                 </a:solidFill>
               </a:rPr>
               <a:t>Package 2</a:t>
             </a:r>
-            <a:endParaRPr lang="ko-KR" altLang="en-US" sz="1400" b="1" dirty="0">
+            <a:endParaRPr lang="ko-KR" altLang="en-US" b="1" dirty="0">
               <a:solidFill>
                 <a:srgbClr val="FF0000"/>
               </a:solidFill>
@@ -4811,10 +4873,10 @@
       </p:sp>
       <p:sp>
         <p:nvSpPr>
-          <p:cNvPr id="84" name="직사각형 83">
-            <a:extLst>
-              <a:ext uri="{FF2B5EF4-FFF2-40B4-BE49-F238E27FC236}">
-                <a16:creationId xmlns:a16="http://schemas.microsoft.com/office/drawing/2014/main" id="{F4EF2FC0-CBD8-403F-9B0A-9150A4C3C309}"/>
+          <p:cNvPr id="37" name="직사각형 36">
+            <a:extLst>
+              <a:ext uri="{FF2B5EF4-FFF2-40B4-BE49-F238E27FC236}">
+                <a16:creationId xmlns:a16="http://schemas.microsoft.com/office/drawing/2014/main" id="{EB5F0003-FCD6-4473-870C-9BE2ACCD475F}"/>
               </a:ext>
             </a:extLst>
           </p:cNvPr>
@@ -4823,20 +4885,20 @@
         </p:nvSpPr>
         <p:spPr>
           <a:xfrm>
-            <a:off x="219225" y="2630674"/>
-            <a:ext cx="6019650" cy="3718311"/>
+            <a:off x="6762862" y="2524401"/>
+            <a:ext cx="4478880" cy="2009499"/>
           </a:xfrm>
           <a:prstGeom prst="rect">
             <a:avLst/>
           </a:prstGeom>
           <a:solidFill>
-            <a:srgbClr val="92D050">
+            <a:schemeClr val="accent2">
               <a:alpha val="20000"/>
-            </a:srgbClr>
+            </a:schemeClr>
           </a:solidFill>
           <a:ln w="57150">
             <a:solidFill>
-              <a:schemeClr val="accent1"/>
+              <a:srgbClr val="C00000"/>
             </a:solidFill>
           </a:ln>
         </p:spPr>
@@ -4859,16 +4921,16 @@
           <a:lstStyle/>
           <a:p>
             <a:pPr algn="ctr"/>
-            <a:endParaRPr lang="ko-KR" altLang="en-US"/>
-          </a:p>
-        </p:txBody>
-      </p:sp>
-      <p:sp>
-        <p:nvSpPr>
-          <p:cNvPr id="85" name="직사각형 84">
-            <a:extLst>
-              <a:ext uri="{FF2B5EF4-FFF2-40B4-BE49-F238E27FC236}">
-                <a16:creationId xmlns:a16="http://schemas.microsoft.com/office/drawing/2014/main" id="{1B5D784A-298C-46AB-B00B-F5F1E6A970D5}"/>
+            <a:endParaRPr lang="ko-KR" altLang="en-US" dirty="0"/>
+          </a:p>
+        </p:txBody>
+      </p:sp>
+      <p:sp>
+        <p:nvSpPr>
+          <p:cNvPr id="4" name="직사각형 3">
+            <a:extLst>
+              <a:ext uri="{FF2B5EF4-FFF2-40B4-BE49-F238E27FC236}">
+                <a16:creationId xmlns:a16="http://schemas.microsoft.com/office/drawing/2014/main" id="{1141F144-B02D-47E6-95C7-55CE33F78B51}"/>
               </a:ext>
             </a:extLst>
           </p:cNvPr>
@@ -4877,20 +4939,64 @@
         </p:nvSpPr>
         <p:spPr>
           <a:xfrm>
-            <a:off x="6854057" y="2524401"/>
-            <a:ext cx="4556893" cy="2009499"/>
+            <a:off x="9719429" y="4865674"/>
+            <a:ext cx="1112292" cy="323165"/>
+          </a:xfrm>
+          <a:prstGeom prst="rect">
+            <a:avLst/>
+          </a:prstGeom>
+        </p:spPr>
+        <p:txBody>
+          <a:bodyPr wrap="none">
+            <a:spAutoFit/>
+          </a:bodyPr>
+          <a:lstStyle/>
+          <a:p>
+            <a:pPr algn="ctr"/>
+            <a:r>
+              <a:rPr lang="en-US" altLang="ko-KR" sz="1500" b="1" dirty="0">
+                <a:solidFill>
+                  <a:srgbClr val="FF0000"/>
+                </a:solidFill>
+              </a:rPr>
+              <a:t>Package 3</a:t>
+            </a:r>
+            <a:endParaRPr lang="ko-KR" altLang="en-US" sz="1500" b="1" dirty="0">
+              <a:solidFill>
+                <a:srgbClr val="FF0000"/>
+              </a:solidFill>
+            </a:endParaRPr>
+          </a:p>
+        </p:txBody>
+      </p:sp>
+      <p:sp>
+        <p:nvSpPr>
+          <p:cNvPr id="39" name="직사각형 38">
+            <a:extLst>
+              <a:ext uri="{FF2B5EF4-FFF2-40B4-BE49-F238E27FC236}">
+                <a16:creationId xmlns:a16="http://schemas.microsoft.com/office/drawing/2014/main" id="{418073EB-8AA8-426B-ABDA-290AD044A615}"/>
+              </a:ext>
+            </a:extLst>
+          </p:cNvPr>
+          <p:cNvSpPr/>
+          <p:nvPr/>
+        </p:nvSpPr>
+        <p:spPr>
+          <a:xfrm>
+            <a:off x="8375514" y="4910499"/>
+            <a:ext cx="3709588" cy="1714419"/>
           </a:xfrm>
           <a:prstGeom prst="rect">
             <a:avLst/>
           </a:prstGeom>
           <a:solidFill>
-            <a:schemeClr val="accent2">
-              <a:alpha val="20000"/>
-            </a:schemeClr>
+            <a:srgbClr val="FFFF00">
+              <a:alpha val="15000"/>
+            </a:srgbClr>
           </a:solidFill>
           <a:ln w="57150">
             <a:solidFill>
-              <a:srgbClr val="C00000"/>
+              <a:schemeClr val="tx1"/>
             </a:solidFill>
           </a:ln>
         </p:spPr>
@@ -4919,10 +5025,10 @@
       </p:sp>
       <p:sp>
         <p:nvSpPr>
-          <p:cNvPr id="86" name="직사각형 85">
-            <a:extLst>
-              <a:ext uri="{FF2B5EF4-FFF2-40B4-BE49-F238E27FC236}">
-                <a16:creationId xmlns:a16="http://schemas.microsoft.com/office/drawing/2014/main" id="{81C18B6F-A154-4F94-AC95-B1F8D0C62EFA}"/>
+          <p:cNvPr id="40" name="직사각형 39">
+            <a:extLst>
+              <a:ext uri="{FF2B5EF4-FFF2-40B4-BE49-F238E27FC236}">
+                <a16:creationId xmlns:a16="http://schemas.microsoft.com/office/drawing/2014/main" id="{78FB2563-63AA-41E8-9CB4-DC91E6EAF552}"/>
               </a:ext>
             </a:extLst>
           </p:cNvPr>
@@ -4931,20 +5037,20 @@
         </p:nvSpPr>
         <p:spPr>
           <a:xfrm>
-            <a:off x="8375514" y="4910499"/>
-            <a:ext cx="3709588" cy="1823676"/>
+            <a:off x="228190" y="2630674"/>
+            <a:ext cx="6019650" cy="3718311"/>
           </a:xfrm>
           <a:prstGeom prst="rect">
             <a:avLst/>
           </a:prstGeom>
           <a:solidFill>
-            <a:srgbClr val="FFFF00">
-              <a:alpha val="15000"/>
+            <a:srgbClr val="92D050">
+              <a:alpha val="20000"/>
             </a:srgbClr>
           </a:solidFill>
           <a:ln w="57150">
             <a:solidFill>
-              <a:schemeClr val="tx1"/>
+              <a:schemeClr val="accent1"/>
             </a:solidFill>
           </a:ln>
         </p:spPr>
@@ -4971,10 +5077,270 @@
           </a:p>
         </p:txBody>
       </p:sp>
+      <p:pic>
+        <p:nvPicPr>
+          <p:cNvPr id="42" name="그래픽 41" descr="돋보기">
+            <a:extLst>
+              <a:ext uri="{FF2B5EF4-FFF2-40B4-BE49-F238E27FC236}">
+                <a16:creationId xmlns:a16="http://schemas.microsoft.com/office/drawing/2014/main" id="{FB393BC7-B362-469E-9E48-C3EAA170113E}"/>
+              </a:ext>
+            </a:extLst>
+          </p:cNvPr>
+          <p:cNvPicPr>
+            <a:picLocks noChangeAspect="1"/>
+          </p:cNvPicPr>
+          <p:nvPr/>
+        </p:nvPicPr>
+        <p:blipFill>
+          <a:blip r:embed="rId2">
+            <a:extLst>
+              <a:ext uri="{28A0092B-C50C-407E-A947-70E740481C1C}">
+                <a14:useLocalDpi xmlns:a14="http://schemas.microsoft.com/office/drawing/2010/main" val="0"/>
+              </a:ext>
+              <a:ext uri="{96DAC541-7B7A-43D3-8B79-37D633B846F1}">
+                <asvg:svgBlip xmlns:asvg="http://schemas.microsoft.com/office/drawing/2016/SVG/main" r:embed="rId3"/>
+              </a:ext>
+            </a:extLst>
+          </a:blip>
+          <a:stretch>
+            <a:fillRect/>
+          </a:stretch>
+        </p:blipFill>
+        <p:spPr>
+          <a:xfrm rot="21195967">
+            <a:off x="2265584" y="3743230"/>
+            <a:ext cx="2312630" cy="2312630"/>
+          </a:xfrm>
+          <a:prstGeom prst="rect">
+            <a:avLst/>
+          </a:prstGeom>
+        </p:spPr>
+      </p:pic>
     </p:spTree>
     <p:extLst>
       <p:ext uri="{BB962C8B-B14F-4D97-AF65-F5344CB8AC3E}">
         <p14:creationId xmlns:p14="http://schemas.microsoft.com/office/powerpoint/2010/main" val="2516193378"/>
+      </p:ext>
+    </p:extLst>
+  </p:cSld>
+  <p:clrMapOvr>
+    <a:masterClrMapping/>
+  </p:clrMapOvr>
+</p:sld>
+</file>
+
+<file path=ppt/slides/slide2.xml><?xml version="1.0" encoding="utf-8"?>
+<p:sld xmlns:a="http://schemas.openxmlformats.org/drawingml/2006/main" xmlns:r="http://schemas.openxmlformats.org/officeDocument/2006/relationships" xmlns:p="http://schemas.openxmlformats.org/presentationml/2006/main">
+  <p:cSld>
+    <p:spTree>
+      <p:nvGrpSpPr>
+        <p:cNvPr id="1" name=""/>
+        <p:cNvGrpSpPr/>
+        <p:nvPr/>
+      </p:nvGrpSpPr>
+      <p:grpSpPr>
+        <a:xfrm>
+          <a:off x="0" y="0"/>
+          <a:ext cx="0" cy="0"/>
+          <a:chOff x="0" y="0"/>
+          <a:chExt cx="0" cy="0"/>
+        </a:xfrm>
+      </p:grpSpPr>
+      <p:pic>
+        <p:nvPicPr>
+          <p:cNvPr id="3" name="그림 2">
+            <a:extLst>
+              <a:ext uri="{FF2B5EF4-FFF2-40B4-BE49-F238E27FC236}">
+                <a16:creationId xmlns:a16="http://schemas.microsoft.com/office/drawing/2014/main" id="{09C81468-988C-4F78-AB6B-E2221793C4BD}"/>
+              </a:ext>
+            </a:extLst>
+          </p:cNvPr>
+          <p:cNvPicPr>
+            <a:picLocks noChangeAspect="1"/>
+          </p:cNvPicPr>
+          <p:nvPr/>
+        </p:nvPicPr>
+        <p:blipFill>
+          <a:blip r:embed="rId2">
+            <a:extLst>
+              <a:ext uri="{28A0092B-C50C-407E-A947-70E740481C1C}">
+                <a14:useLocalDpi xmlns:a14="http://schemas.microsoft.com/office/drawing/2010/main" val="0"/>
+              </a:ext>
+            </a:extLst>
+          </a:blip>
+          <a:stretch>
+            <a:fillRect/>
+          </a:stretch>
+        </p:blipFill>
+        <p:spPr>
+          <a:xfrm>
+            <a:off x="1392443" y="1028700"/>
+            <a:ext cx="8923020" cy="4800600"/>
+          </a:xfrm>
+          <a:prstGeom prst="rect">
+            <a:avLst/>
+          </a:prstGeom>
+        </p:spPr>
+      </p:pic>
+      <p:pic>
+        <p:nvPicPr>
+          <p:cNvPr id="4" name="그래픽 3" descr="돋보기">
+            <a:extLst>
+              <a:ext uri="{FF2B5EF4-FFF2-40B4-BE49-F238E27FC236}">
+                <a16:creationId xmlns:a16="http://schemas.microsoft.com/office/drawing/2014/main" id="{1684DE16-AFD7-48AF-9624-FC6CC4EC3F6E}"/>
+              </a:ext>
+            </a:extLst>
+          </p:cNvPr>
+          <p:cNvPicPr>
+            <a:picLocks noChangeAspect="1"/>
+          </p:cNvPicPr>
+          <p:nvPr/>
+        </p:nvPicPr>
+        <p:blipFill>
+          <a:blip r:embed="rId3">
+            <a:extLst>
+              <a:ext uri="{28A0092B-C50C-407E-A947-70E740481C1C}">
+                <a14:useLocalDpi xmlns:a14="http://schemas.microsoft.com/office/drawing/2010/main" val="0"/>
+              </a:ext>
+              <a:ext uri="{96DAC541-7B7A-43D3-8B79-37D633B846F1}">
+                <asvg:svgBlip xmlns:asvg="http://schemas.microsoft.com/office/drawing/2016/SVG/main" r:embed="rId4"/>
+              </a:ext>
+            </a:extLst>
+          </a:blip>
+          <a:stretch>
+            <a:fillRect/>
+          </a:stretch>
+        </p:blipFill>
+        <p:spPr>
+          <a:xfrm>
+            <a:off x="5559312" y="2564148"/>
+            <a:ext cx="1491728" cy="1491728"/>
+          </a:xfrm>
+          <a:prstGeom prst="rect">
+            <a:avLst/>
+          </a:prstGeom>
+        </p:spPr>
+      </p:pic>
+    </p:spTree>
+    <p:extLst>
+      <p:ext uri="{BB962C8B-B14F-4D97-AF65-F5344CB8AC3E}">
+        <p14:creationId xmlns:p14="http://schemas.microsoft.com/office/powerpoint/2010/main" val="3284996604"/>
+      </p:ext>
+    </p:extLst>
+  </p:cSld>
+  <p:clrMapOvr>
+    <a:masterClrMapping/>
+  </p:clrMapOvr>
+</p:sld>
+</file>
+
+<file path=ppt/slides/slide3.xml><?xml version="1.0" encoding="utf-8"?>
+<p:sld xmlns:a="http://schemas.openxmlformats.org/drawingml/2006/main" xmlns:r="http://schemas.openxmlformats.org/officeDocument/2006/relationships" xmlns:p="http://schemas.openxmlformats.org/presentationml/2006/main">
+  <p:cSld>
+    <p:spTree>
+      <p:nvGrpSpPr>
+        <p:cNvPr id="1" name=""/>
+        <p:cNvGrpSpPr/>
+        <p:nvPr/>
+      </p:nvGrpSpPr>
+      <p:grpSpPr>
+        <a:xfrm>
+          <a:off x="0" y="0"/>
+          <a:ext cx="0" cy="0"/>
+          <a:chOff x="0" y="0"/>
+          <a:chExt cx="0" cy="0"/>
+        </a:xfrm>
+      </p:grpSpPr>
+      <p:pic>
+        <p:nvPicPr>
+          <p:cNvPr id="2050" name="Picture 2" descr="https://lh3.googleusercontent.com/5TZgLqtB8Lm9BLczxxSm9zwN0WnuB6Sy0yc5m-s2z2N-dX_ypAjXMm_M_3f3mKk47X1dGrjZsy8I2qlBXqMVJiQsAPzPrT8X8H3EixTBw7QzgJXr0iXG97xLO9VwI6XXaEinGqAW-lI">
+            <a:extLst>
+              <a:ext uri="{FF2B5EF4-FFF2-40B4-BE49-F238E27FC236}">
+                <a16:creationId xmlns:a16="http://schemas.microsoft.com/office/drawing/2014/main" id="{8631CB02-1CB0-46E1-82D0-5EB3066425ED}"/>
+              </a:ext>
+            </a:extLst>
+          </p:cNvPr>
+          <p:cNvPicPr>
+            <a:picLocks noChangeAspect="1" noChangeArrowheads="1"/>
+          </p:cNvPicPr>
+          <p:nvPr/>
+        </p:nvPicPr>
+        <p:blipFill>
+          <a:blip r:embed="rId2">
+            <a:extLst>
+              <a:ext uri="{28A0092B-C50C-407E-A947-70E740481C1C}">
+                <a14:useLocalDpi xmlns:a14="http://schemas.microsoft.com/office/drawing/2010/main" val="0"/>
+              </a:ext>
+            </a:extLst>
+          </a:blip>
+          <a:srcRect/>
+          <a:stretch>
+            <a:fillRect/>
+          </a:stretch>
+        </p:blipFill>
+        <p:spPr bwMode="auto">
+          <a:xfrm>
+            <a:off x="2915920" y="411480"/>
+            <a:ext cx="5791200" cy="5486400"/>
+          </a:xfrm>
+          <a:prstGeom prst="rect">
+            <a:avLst/>
+          </a:prstGeom>
+          <a:noFill/>
+          <a:extLst>
+            <a:ext uri="{909E8E84-426E-40DD-AFC4-6F175D3DCCD1}">
+              <a14:hiddenFill xmlns:a14="http://schemas.microsoft.com/office/drawing/2010/main">
+                <a:solidFill>
+                  <a:srgbClr val="FFFFFF"/>
+                </a:solidFill>
+              </a14:hiddenFill>
+            </a:ext>
+          </a:extLst>
+        </p:spPr>
+      </p:pic>
+      <p:pic>
+        <p:nvPicPr>
+          <p:cNvPr id="5" name="그래픽 4" descr="돋보기">
+            <a:extLst>
+              <a:ext uri="{FF2B5EF4-FFF2-40B4-BE49-F238E27FC236}">
+                <a16:creationId xmlns:a16="http://schemas.microsoft.com/office/drawing/2014/main" id="{7AFBECE5-66D2-4910-B976-7D1815480F8E}"/>
+              </a:ext>
+            </a:extLst>
+          </p:cNvPr>
+          <p:cNvPicPr>
+            <a:picLocks noChangeAspect="1"/>
+          </p:cNvPicPr>
+          <p:nvPr/>
+        </p:nvPicPr>
+        <p:blipFill>
+          <a:blip r:embed="rId3">
+            <a:extLst>
+              <a:ext uri="{28A0092B-C50C-407E-A947-70E740481C1C}">
+                <a14:useLocalDpi xmlns:a14="http://schemas.microsoft.com/office/drawing/2010/main" val="0"/>
+              </a:ext>
+              <a:ext uri="{96DAC541-7B7A-43D3-8B79-37D633B846F1}">
+                <asvg:svgBlip xmlns:asvg="http://schemas.microsoft.com/office/drawing/2016/SVG/main" r:embed="rId4"/>
+              </a:ext>
+            </a:extLst>
+          </a:blip>
+          <a:stretch>
+            <a:fillRect/>
+          </a:stretch>
+        </p:blipFill>
+        <p:spPr>
+          <a:xfrm>
+            <a:off x="2785632" y="300616"/>
+            <a:ext cx="7171168" cy="7171168"/>
+          </a:xfrm>
+          <a:prstGeom prst="rect">
+            <a:avLst/>
+          </a:prstGeom>
+        </p:spPr>
+      </p:pic>
+    </p:spTree>
+    <p:extLst>
+      <p:ext uri="{BB962C8B-B14F-4D97-AF65-F5344CB8AC3E}">
+        <p14:creationId xmlns:p14="http://schemas.microsoft.com/office/powerpoint/2010/main" val="2478110661"/>
       </p:ext>
     </p:extLst>
   </p:cSld>

</xml_diff>